<commit_message>
finish checkpoint 1 (?)
</commit_message>
<xml_diff>
--- a/Proj2/docs/IA-T10-G27-Checkpoint1.pptx
+++ b/Proj2/docs/IA-T10-G27-Checkpoint1.pptx
@@ -245,6 +245,11 @@
       </a:defRPr>
     </a:lvl9pPr>
   </p:defaultTextStyle>
+  <p:extLst>
+    <p:ext uri="{EFAFB233-063F-42B5-8137-9DF3F51BA10A}">
+      <p15:sldGuideLst xmlns:p15="http://schemas.microsoft.com/office/powerpoint/2012/main"/>
+    </p:ext>
+  </p:extLst>
 </p:presentation>
 </file>
 
@@ -8491,7 +8496,7 @@
         <p:spPr>
           <a:xfrm>
             <a:off x="720000" y="1387164"/>
-            <a:ext cx="8097429" cy="612600"/>
+            <a:ext cx="8097429" cy="2830112"/>
           </a:xfrm>
           <a:prstGeom prst="rect">
             <a:avLst/>
@@ -8520,8 +8525,369 @@
                 <a:effectLst/>
                 <a:latin typeface="Inter"/>
               </a:rPr>
-              <a:t>The task is to predict whether a given flight will be delayed, given the information of the scheduled departure.</a:t>
+              <a:t>The task at hand is a binary classification problem, to predict whether a given flight will be delayed, given the information of the scheduled departure.</a:t>
             </a:r>
+          </a:p>
+          <a:p>
+            <a:pPr marL="0" lvl="0" indent="0" algn="just" rtl="0">
+              <a:spcBef>
+                <a:spcPts val="0"/>
+              </a:spcBef>
+              <a:spcAft>
+                <a:spcPts val="0"/>
+              </a:spcAft>
+              <a:buNone/>
+            </a:pPr>
+            <a:endParaRPr lang="en-US" u="sng" dirty="0">
+              <a:solidFill>
+                <a:srgbClr val="3C4043"/>
+              </a:solidFill>
+              <a:latin typeface="Inter"/>
+            </a:endParaRPr>
+          </a:p>
+          <a:p>
+            <a:pPr marL="0" lvl="0" indent="0" algn="just" rtl="0">
+              <a:spcBef>
+                <a:spcPts val="0"/>
+              </a:spcBef>
+              <a:spcAft>
+                <a:spcPts val="0"/>
+              </a:spcAft>
+              <a:buNone/>
+            </a:pPr>
+            <a:r>
+              <a:rPr lang="en-US" dirty="0">
+                <a:solidFill>
+                  <a:srgbClr val="3C4043"/>
+                </a:solidFill>
+                <a:latin typeface="Inter"/>
+              </a:rPr>
+              <a:t>Dataset attributes:</a:t>
+            </a:r>
+          </a:p>
+          <a:p>
+            <a:pPr marL="285750" lvl="0" indent="-285750" algn="just" rtl="0">
+              <a:lnSpc>
+                <a:spcPct val="150000"/>
+              </a:lnSpc>
+              <a:spcBef>
+                <a:spcPts val="0"/>
+              </a:spcBef>
+              <a:spcAft>
+                <a:spcPts val="0"/>
+              </a:spcAft>
+              <a:buFont typeface="Arial" panose="020B0604020202020204" pitchFamily="34" charset="0"/>
+              <a:buChar char="•"/>
+            </a:pPr>
+            <a:r>
+              <a:rPr lang="en-US" b="0" i="0" u="sng" dirty="0">
+                <a:solidFill>
+                  <a:srgbClr val="263238"/>
+                </a:solidFill>
+                <a:effectLst/>
+                <a:latin typeface="Inter"/>
+              </a:rPr>
+              <a:t>Flight</a:t>
+            </a:r>
+            <a:r>
+              <a:rPr lang="en-US" dirty="0">
+                <a:solidFill>
+                  <a:srgbClr val="263238"/>
+                </a:solidFill>
+                <a:latin typeface="Inter"/>
+              </a:rPr>
+              <a:t> - </a:t>
+            </a:r>
+            <a:r>
+              <a:rPr lang="en-US" b="0" i="0" dirty="0">
+                <a:solidFill>
+                  <a:srgbClr val="263238"/>
+                </a:solidFill>
+                <a:effectLst/>
+                <a:latin typeface="Inter"/>
+              </a:rPr>
+              <a:t>Flight ID</a:t>
+            </a:r>
+          </a:p>
+          <a:p>
+            <a:pPr marL="285750" lvl="0" indent="-285750" algn="just" rtl="0">
+              <a:spcBef>
+                <a:spcPts val="0"/>
+              </a:spcBef>
+              <a:spcAft>
+                <a:spcPts val="0"/>
+              </a:spcAft>
+              <a:buFont typeface="Arial" panose="020B0604020202020204" pitchFamily="34" charset="0"/>
+              <a:buChar char="•"/>
+            </a:pPr>
+            <a:r>
+              <a:rPr lang="en-US" b="0" i="0" u="sng" dirty="0">
+                <a:solidFill>
+                  <a:srgbClr val="263238"/>
+                </a:solidFill>
+                <a:effectLst/>
+                <a:latin typeface="Inter"/>
+              </a:rPr>
+              <a:t>Time</a:t>
+            </a:r>
+            <a:r>
+              <a:rPr lang="en-US" dirty="0">
+                <a:solidFill>
+                  <a:srgbClr val="263238"/>
+                </a:solidFill>
+                <a:latin typeface="Inter"/>
+              </a:rPr>
+              <a:t> - </a:t>
+            </a:r>
+            <a:r>
+              <a:rPr lang="en-US" b="0" i="0" dirty="0">
+                <a:solidFill>
+                  <a:srgbClr val="263238"/>
+                </a:solidFill>
+                <a:effectLst/>
+                <a:latin typeface="Inter"/>
+              </a:rPr>
+              <a:t>Time of departure</a:t>
+            </a:r>
+          </a:p>
+          <a:p>
+            <a:pPr marL="285750" lvl="0" indent="-285750" algn="just" rtl="0">
+              <a:spcBef>
+                <a:spcPts val="0"/>
+              </a:spcBef>
+              <a:spcAft>
+                <a:spcPts val="0"/>
+              </a:spcAft>
+              <a:buFont typeface="Arial" panose="020B0604020202020204" pitchFamily="34" charset="0"/>
+              <a:buChar char="•"/>
+            </a:pPr>
+            <a:r>
+              <a:rPr lang="en-US" b="0" i="0" u="sng" dirty="0">
+                <a:solidFill>
+                  <a:srgbClr val="263238"/>
+                </a:solidFill>
+                <a:effectLst/>
+                <a:latin typeface="Inter"/>
+              </a:rPr>
+              <a:t>Length</a:t>
+            </a:r>
+            <a:r>
+              <a:rPr lang="en-US" dirty="0">
+                <a:solidFill>
+                  <a:srgbClr val="263238"/>
+                </a:solidFill>
+                <a:latin typeface="Inter"/>
+              </a:rPr>
+              <a:t> - </a:t>
+            </a:r>
+            <a:r>
+              <a:rPr lang="en-US" b="0" i="0" dirty="0">
+                <a:solidFill>
+                  <a:srgbClr val="263238"/>
+                </a:solidFill>
+                <a:effectLst/>
+                <a:latin typeface="Inter"/>
+              </a:rPr>
+              <a:t>Length of Flight</a:t>
+            </a:r>
+          </a:p>
+          <a:p>
+            <a:pPr marL="285750" lvl="0" indent="-285750" algn="just" rtl="0">
+              <a:spcBef>
+                <a:spcPts val="0"/>
+              </a:spcBef>
+              <a:spcAft>
+                <a:spcPts val="0"/>
+              </a:spcAft>
+              <a:buFont typeface="Arial" panose="020B0604020202020204" pitchFamily="34" charset="0"/>
+              <a:buChar char="•"/>
+            </a:pPr>
+            <a:r>
+              <a:rPr lang="en-US" b="0" i="0" u="sng" dirty="0">
+                <a:solidFill>
+                  <a:srgbClr val="263238"/>
+                </a:solidFill>
+                <a:effectLst/>
+                <a:latin typeface="Inter"/>
+              </a:rPr>
+              <a:t>Airline</a:t>
+            </a:r>
+            <a:r>
+              <a:rPr lang="en-US" dirty="0">
+                <a:solidFill>
+                  <a:srgbClr val="263238"/>
+                </a:solidFill>
+                <a:latin typeface="Inter"/>
+              </a:rPr>
+              <a:t> - </a:t>
+            </a:r>
+            <a:r>
+              <a:rPr lang="en-US" b="0" i="0" dirty="0">
+                <a:solidFill>
+                  <a:srgbClr val="263238"/>
+                </a:solidFill>
+                <a:effectLst/>
+                <a:latin typeface="Inter"/>
+              </a:rPr>
+              <a:t>Airline ID</a:t>
+            </a:r>
+          </a:p>
+          <a:p>
+            <a:pPr marL="285750" lvl="0" indent="-285750" algn="just" rtl="0">
+              <a:spcBef>
+                <a:spcPts val="0"/>
+              </a:spcBef>
+              <a:spcAft>
+                <a:spcPts val="0"/>
+              </a:spcAft>
+              <a:buFont typeface="Arial" panose="020B0604020202020204" pitchFamily="34" charset="0"/>
+              <a:buChar char="•"/>
+            </a:pPr>
+            <a:r>
+              <a:rPr lang="en-US" b="0" i="0" u="sng" dirty="0" err="1">
+                <a:solidFill>
+                  <a:srgbClr val="263238"/>
+                </a:solidFill>
+                <a:effectLst/>
+                <a:latin typeface="Inter"/>
+              </a:rPr>
+              <a:t>AirportFrom</a:t>
+            </a:r>
+            <a:r>
+              <a:rPr lang="en-US" dirty="0">
+                <a:solidFill>
+                  <a:srgbClr val="263238"/>
+                </a:solidFill>
+                <a:latin typeface="Inter"/>
+              </a:rPr>
+              <a:t> - </a:t>
+            </a:r>
+            <a:r>
+              <a:rPr lang="en-US" b="0" i="0" dirty="0">
+                <a:solidFill>
+                  <a:srgbClr val="263238"/>
+                </a:solidFill>
+                <a:effectLst/>
+                <a:latin typeface="Inter"/>
+              </a:rPr>
+              <a:t>Which airport the flight flew from</a:t>
+            </a:r>
+          </a:p>
+          <a:p>
+            <a:pPr marL="285750" lvl="0" indent="-285750" algn="just" rtl="0">
+              <a:spcBef>
+                <a:spcPts val="0"/>
+              </a:spcBef>
+              <a:spcAft>
+                <a:spcPts val="0"/>
+              </a:spcAft>
+              <a:buFont typeface="Arial" panose="020B0604020202020204" pitchFamily="34" charset="0"/>
+              <a:buChar char="•"/>
+            </a:pPr>
+            <a:r>
+              <a:rPr lang="en-US" b="0" i="0" u="sng" dirty="0" err="1">
+                <a:solidFill>
+                  <a:srgbClr val="263238"/>
+                </a:solidFill>
+                <a:effectLst/>
+                <a:latin typeface="Inter"/>
+              </a:rPr>
+              <a:t>AirportTo</a:t>
+            </a:r>
+            <a:r>
+              <a:rPr lang="en-US" dirty="0">
+                <a:solidFill>
+                  <a:srgbClr val="263238"/>
+                </a:solidFill>
+                <a:latin typeface="Inter"/>
+              </a:rPr>
+              <a:t> - </a:t>
+            </a:r>
+            <a:r>
+              <a:rPr lang="en-US" b="0" i="0" dirty="0">
+                <a:solidFill>
+                  <a:srgbClr val="263238"/>
+                </a:solidFill>
+                <a:effectLst/>
+                <a:latin typeface="Inter"/>
+              </a:rPr>
+              <a:t>Which airport the flight flew to</a:t>
+            </a:r>
+          </a:p>
+          <a:p>
+            <a:pPr marL="285750" lvl="0" indent="-285750" algn="just" rtl="0">
+              <a:spcBef>
+                <a:spcPts val="0"/>
+              </a:spcBef>
+              <a:spcAft>
+                <a:spcPts val="0"/>
+              </a:spcAft>
+              <a:buFont typeface="Arial" panose="020B0604020202020204" pitchFamily="34" charset="0"/>
+              <a:buChar char="•"/>
+            </a:pPr>
+            <a:r>
+              <a:rPr lang="en-US" b="0" i="0" u="sng" dirty="0" err="1">
+                <a:solidFill>
+                  <a:srgbClr val="263238"/>
+                </a:solidFill>
+                <a:effectLst/>
+                <a:latin typeface="Inter"/>
+              </a:rPr>
+              <a:t>DayOfWeek</a:t>
+            </a:r>
+            <a:r>
+              <a:rPr lang="en-US" b="0" i="0" dirty="0">
+                <a:solidFill>
+                  <a:srgbClr val="263238"/>
+                </a:solidFill>
+                <a:effectLst/>
+                <a:latin typeface="Inter"/>
+              </a:rPr>
+              <a:t> - Day of the week of the flight</a:t>
+            </a:r>
+          </a:p>
+          <a:p>
+            <a:pPr marL="285750" lvl="0" indent="-285750" algn="just" rtl="0">
+              <a:spcBef>
+                <a:spcPts val="0"/>
+              </a:spcBef>
+              <a:spcAft>
+                <a:spcPts val="0"/>
+              </a:spcAft>
+              <a:buFont typeface="Arial" panose="020B0604020202020204" pitchFamily="34" charset="0"/>
+              <a:buChar char="•"/>
+            </a:pPr>
+            <a:r>
+              <a:rPr lang="en-US" b="0" i="0" u="sng" dirty="0">
+                <a:solidFill>
+                  <a:srgbClr val="263238"/>
+                </a:solidFill>
+                <a:effectLst/>
+                <a:latin typeface="Inter"/>
+              </a:rPr>
+              <a:t>Class</a:t>
+            </a:r>
+            <a:r>
+              <a:rPr lang="en-US" b="0" i="0" dirty="0">
+                <a:solidFill>
+                  <a:srgbClr val="263238"/>
+                </a:solidFill>
+                <a:effectLst/>
+                <a:latin typeface="Inter"/>
+              </a:rPr>
+              <a:t> - Delayed (1) or not (0)</a:t>
+            </a:r>
+          </a:p>
+          <a:p>
+            <a:pPr marL="0" lvl="0" indent="0" algn="just" rtl="0">
+              <a:spcBef>
+                <a:spcPts val="0"/>
+              </a:spcBef>
+              <a:spcAft>
+                <a:spcPts val="0"/>
+              </a:spcAft>
+              <a:buNone/>
+            </a:pPr>
             <a:endParaRPr dirty="0"/>
           </a:p>
         </p:txBody>
@@ -8605,8 +8971,8 @@
         </p:nvSpPr>
         <p:spPr>
           <a:xfrm>
-            <a:off x="720000" y="1372648"/>
-            <a:ext cx="6157668" cy="1885809"/>
+            <a:off x="719999" y="1372648"/>
+            <a:ext cx="7974683" cy="1885809"/>
           </a:xfrm>
           <a:prstGeom prst="rect">
             <a:avLst/>
@@ -8618,7 +8984,7 @@
           </a:bodyPr>
           <a:lstStyle/>
           <a:p>
-            <a:pPr marL="285750" lvl="0" indent="-285750" algn="l" rtl="0">
+            <a:pPr marL="285750" lvl="0" indent="-285750" algn="just" rtl="0">
               <a:lnSpc>
                 <a:spcPct val="150000"/>
               </a:lnSpc>
@@ -8633,15 +8999,15 @@
             </a:pPr>
             <a:r>
               <a:rPr lang="en" u="sng" dirty="0"/>
-              <a:t>Programming language:</a:t>
+              <a:t>Programming language</a:t>
             </a:r>
             <a:r>
               <a:rPr lang="en" dirty="0"/>
-              <a:t> Python</a:t>
+              <a:t>: Python</a:t>
             </a:r>
           </a:p>
           <a:p>
-            <a:pPr marL="285750" lvl="0" indent="-285750" algn="l" rtl="0">
+            <a:pPr marL="285750" lvl="0" indent="-285750" algn="just" rtl="0">
               <a:lnSpc>
                 <a:spcPct val="150000"/>
               </a:lnSpc>
@@ -8656,15 +9022,24 @@
             </a:pPr>
             <a:r>
               <a:rPr lang="en" u="sng" dirty="0"/>
-              <a:t>Python libraries:</a:t>
+              <a:t>Python libraries</a:t>
             </a:r>
             <a:r>
               <a:rPr lang="en" dirty="0"/>
-              <a:t> Pandas, …</a:t>
+              <a:t>: Pandas, Seaborn, </a:t>
             </a:r>
+            <a:r>
+              <a:rPr lang="pt-PT" dirty="0" err="1"/>
+              <a:t>Scikit-Learn</a:t>
+            </a:r>
+            <a:r>
+              <a:rPr lang="pt-PT" dirty="0"/>
+              <a:t>, …</a:t>
+            </a:r>
+            <a:endParaRPr lang="en" dirty="0"/>
           </a:p>
           <a:p>
-            <a:pPr marL="285750" lvl="0" indent="-285750" algn="l" rtl="0">
+            <a:pPr marL="285750" lvl="0" indent="-285750" algn="just" rtl="0">
               <a:lnSpc>
                 <a:spcPct val="150000"/>
               </a:lnSpc>
@@ -8679,15 +9054,15 @@
             </a:pPr>
             <a:r>
               <a:rPr lang="en" u="sng" dirty="0"/>
-              <a:t>Development environment:</a:t>
+              <a:t>Development environment</a:t>
             </a:r>
             <a:r>
               <a:rPr lang="en" dirty="0"/>
-              <a:t> Jupyter Notebook / VSCode</a:t>
+              <a:t>: Jupyter Notebook / VSCode</a:t>
             </a:r>
           </a:p>
           <a:p>
-            <a:pPr marL="285750" lvl="0" indent="-285750" algn="l" rtl="0">
+            <a:pPr marL="285750" lvl="0" indent="-285750" algn="just" rtl="0">
               <a:lnSpc>
                 <a:spcPct val="150000"/>
               </a:lnSpc>
@@ -8702,28 +9077,13 @@
             </a:pPr>
             <a:r>
               <a:rPr lang="en" u="sng" dirty="0"/>
-              <a:t>Pre-processing techniques:</a:t>
+              <a:t>Machine learning algorithms</a:t>
             </a:r>
-          </a:p>
-          <a:p>
-            <a:pPr marL="285750" lvl="0" indent="-285750" algn="l" rtl="0">
-              <a:lnSpc>
-                <a:spcPct val="150000"/>
-              </a:lnSpc>
-              <a:spcBef>
-                <a:spcPts val="0"/>
-              </a:spcBef>
-              <a:spcAft>
-                <a:spcPts val="0"/>
-              </a:spcAft>
-              <a:buFont typeface="Arial" panose="020B0604020202020204" pitchFamily="34" charset="0"/>
-              <a:buChar char="•"/>
-            </a:pPr>
             <a:r>
-              <a:rPr lang="en" u="sng" dirty="0"/>
-              <a:t>Machine learning algorithms:</a:t>
+              <a:rPr lang="en" dirty="0"/>
+              <a:t>: Decision Trees, K-Nearest Neighbours, Support Vector Machine, ...</a:t>
             </a:r>
-            <a:endParaRPr u="sng" dirty="0"/>
+            <a:endParaRPr dirty="0"/>
           </a:p>
         </p:txBody>
       </p:sp>
@@ -8811,8 +9171,8 @@
         </p:nvSpPr>
         <p:spPr>
           <a:xfrm>
-            <a:off x="720000" y="1372649"/>
-            <a:ext cx="6157668" cy="612600"/>
+            <a:off x="719999" y="1372649"/>
+            <a:ext cx="8305759" cy="1465144"/>
           </a:xfrm>
           <a:prstGeom prst="rect">
             <a:avLst/>
@@ -8834,10 +9194,218 @@
               <a:buNone/>
             </a:pPr>
             <a:r>
-              <a:rPr lang="en" dirty="0">
-                <a:sym typeface="Wingdings" panose="05000000000000000000" pitchFamily="2" charset="2"/>
-              </a:rPr>
-              <a:t></a:t>
+              <a:rPr lang="pt-PT" dirty="0" err="1"/>
+              <a:t>The</a:t>
+            </a:r>
+            <a:r>
+              <a:rPr lang="pt-PT" dirty="0"/>
+              <a:t> </a:t>
+            </a:r>
+            <a:r>
+              <a:rPr lang="pt-PT" dirty="0" err="1"/>
+              <a:t>dataset</a:t>
+            </a:r>
+            <a:r>
+              <a:rPr lang="pt-PT" dirty="0"/>
+              <a:t> </a:t>
+            </a:r>
+            <a:r>
+              <a:rPr lang="pt-PT" dirty="0" err="1"/>
+              <a:t>has</a:t>
+            </a:r>
+            <a:r>
+              <a:rPr lang="pt-PT" dirty="0"/>
+              <a:t> </a:t>
+            </a:r>
+            <a:r>
+              <a:rPr lang="pt-PT" dirty="0" err="1"/>
+              <a:t>been</a:t>
+            </a:r>
+            <a:r>
+              <a:rPr lang="pt-PT" dirty="0"/>
+              <a:t> </a:t>
+            </a:r>
+            <a:r>
+              <a:rPr lang="pt-PT" dirty="0" err="1"/>
+              <a:t>analysed</a:t>
+            </a:r>
+            <a:r>
+              <a:rPr lang="pt-PT" dirty="0"/>
+              <a:t> </a:t>
+            </a:r>
+            <a:r>
+              <a:rPr lang="pt-PT" dirty="0" err="1"/>
+              <a:t>and</a:t>
+            </a:r>
+            <a:r>
+              <a:rPr lang="pt-PT" dirty="0"/>
+              <a:t> </a:t>
+            </a:r>
+            <a:r>
+              <a:rPr lang="pt-PT" dirty="0" err="1"/>
+              <a:t>pre-processed</a:t>
+            </a:r>
+            <a:r>
+              <a:rPr lang="pt-PT" dirty="0"/>
+              <a:t>. </a:t>
+            </a:r>
+            <a:r>
+              <a:rPr lang="pt-PT" dirty="0" err="1"/>
+              <a:t>The</a:t>
+            </a:r>
+            <a:r>
+              <a:rPr lang="pt-PT" dirty="0"/>
+              <a:t> </a:t>
+            </a:r>
+            <a:r>
+              <a:rPr lang="pt-PT" dirty="0" err="1"/>
+              <a:t>following</a:t>
+            </a:r>
+            <a:r>
+              <a:rPr lang="pt-PT" dirty="0"/>
+              <a:t> </a:t>
+            </a:r>
+            <a:r>
+              <a:rPr lang="pt-PT" dirty="0" err="1"/>
+              <a:t>conclusions</a:t>
+            </a:r>
+            <a:r>
+              <a:rPr lang="pt-PT" dirty="0"/>
+              <a:t> </a:t>
+            </a:r>
+            <a:r>
+              <a:rPr lang="pt-PT" dirty="0" err="1"/>
+              <a:t>were</a:t>
+            </a:r>
+            <a:r>
+              <a:rPr lang="pt-PT" dirty="0"/>
+              <a:t> </a:t>
+            </a:r>
+            <a:r>
+              <a:rPr lang="pt-PT" dirty="0" err="1"/>
+              <a:t>drawn</a:t>
+            </a:r>
+            <a:r>
+              <a:rPr lang="pt-PT" dirty="0"/>
+              <a:t>:</a:t>
+            </a:r>
+          </a:p>
+          <a:p>
+            <a:pPr marL="0" lvl="0" indent="0" algn="l" rtl="0">
+              <a:spcBef>
+                <a:spcPts val="0"/>
+              </a:spcBef>
+              <a:spcAft>
+                <a:spcPts val="0"/>
+              </a:spcAft>
+              <a:buNone/>
+            </a:pPr>
+            <a:endParaRPr lang="pt-PT" dirty="0"/>
+          </a:p>
+          <a:p>
+            <a:pPr marL="285750" lvl="0" indent="-285750" algn="l" rtl="0">
+              <a:spcBef>
+                <a:spcPts val="0"/>
+              </a:spcBef>
+              <a:spcAft>
+                <a:spcPts val="0"/>
+              </a:spcAft>
+              <a:buFont typeface="Arial" panose="020B0604020202020204" pitchFamily="34" charset="0"/>
+              <a:buChar char="•"/>
+            </a:pPr>
+            <a:r>
+              <a:rPr lang="en-US" dirty="0"/>
+              <a:t>There are 539382 rows and 8 cols in the dataset</a:t>
+            </a:r>
+          </a:p>
+          <a:p>
+            <a:pPr marL="285750" lvl="0" indent="-285750" algn="l" rtl="0">
+              <a:spcBef>
+                <a:spcPts val="0"/>
+              </a:spcBef>
+              <a:spcAft>
+                <a:spcPts val="0"/>
+              </a:spcAft>
+              <a:buFont typeface="Arial" panose="020B0604020202020204" pitchFamily="34" charset="0"/>
+              <a:buChar char="•"/>
+            </a:pPr>
+            <a:r>
+              <a:rPr lang="pt-PT" dirty="0" err="1"/>
+              <a:t>There</a:t>
+            </a:r>
+            <a:r>
+              <a:rPr lang="pt-PT" dirty="0"/>
+              <a:t> are 216618 </a:t>
+            </a:r>
+            <a:r>
+              <a:rPr lang="pt-PT" dirty="0" err="1"/>
+              <a:t>duplicates</a:t>
+            </a:r>
+            <a:endParaRPr lang="pt-PT" dirty="0"/>
+          </a:p>
+          <a:p>
+            <a:pPr marL="285750" lvl="0" indent="-285750" algn="l" rtl="0">
+              <a:spcBef>
+                <a:spcPts val="0"/>
+              </a:spcBef>
+              <a:spcAft>
+                <a:spcPts val="0"/>
+              </a:spcAft>
+              <a:buFont typeface="Arial" panose="020B0604020202020204" pitchFamily="34" charset="0"/>
+              <a:buChar char="•"/>
+            </a:pPr>
+            <a:r>
+              <a:rPr lang="pt-PT" dirty="0" err="1"/>
+              <a:t>There</a:t>
+            </a:r>
+            <a:r>
+              <a:rPr lang="pt-PT" dirty="0"/>
+              <a:t> are no </a:t>
+            </a:r>
+            <a:r>
+              <a:rPr lang="pt-PT" dirty="0" err="1"/>
+              <a:t>null</a:t>
+            </a:r>
+            <a:r>
+              <a:rPr lang="pt-PT" dirty="0"/>
+              <a:t> </a:t>
+            </a:r>
+            <a:r>
+              <a:rPr lang="pt-PT" dirty="0" err="1"/>
+              <a:t>values</a:t>
+            </a:r>
+            <a:endParaRPr lang="pt-PT" dirty="0"/>
+          </a:p>
+          <a:p>
+            <a:pPr marL="285750" lvl="0" indent="-285750" algn="l" rtl="0">
+              <a:spcBef>
+                <a:spcPts val="0"/>
+              </a:spcBef>
+              <a:spcAft>
+                <a:spcPts val="0"/>
+              </a:spcAft>
+              <a:buFont typeface="Arial" panose="020B0604020202020204" pitchFamily="34" charset="0"/>
+              <a:buChar char="•"/>
+            </a:pPr>
+            <a:r>
+              <a:rPr lang="pt-PT" dirty="0" err="1"/>
+              <a:t>Length</a:t>
+            </a:r>
+            <a:r>
+              <a:rPr lang="pt-PT" dirty="0"/>
+              <a:t> </a:t>
+            </a:r>
+            <a:r>
+              <a:rPr lang="pt-PT" dirty="0" err="1"/>
+              <a:t>has</a:t>
+            </a:r>
+            <a:r>
+              <a:rPr lang="pt-PT" dirty="0"/>
+              <a:t> some </a:t>
+            </a:r>
+            <a:r>
+              <a:rPr lang="pt-PT" dirty="0" err="1"/>
+              <a:t>outliers</a:t>
             </a:r>
             <a:endParaRPr dirty="0"/>
           </a:p>
@@ -8885,6 +9453,36 @@
           </a:p>
         </p:txBody>
       </p:sp>
+      <p:pic>
+        <p:nvPicPr>
+          <p:cNvPr id="3" name="Picture 2">
+            <a:extLst>
+              <a:ext uri="{FF2B5EF4-FFF2-40B4-BE49-F238E27FC236}">
+                <a16:creationId xmlns:a16="http://schemas.microsoft.com/office/drawing/2014/main" id="{1348B019-7A13-94EB-2B11-69177E991E7B}"/>
+              </a:ext>
+            </a:extLst>
+          </p:cNvPr>
+          <p:cNvPicPr>
+            <a:picLocks noChangeAspect="1"/>
+          </p:cNvPicPr>
+          <p:nvPr/>
+        </p:nvPicPr>
+        <p:blipFill>
+          <a:blip r:embed="rId3"/>
+          <a:stretch>
+            <a:fillRect/>
+          </a:stretch>
+        </p:blipFill>
+        <p:spPr>
+          <a:xfrm>
+            <a:off x="1472293" y="3021688"/>
+            <a:ext cx="6199414" cy="1891231"/>
+          </a:xfrm>
+          <a:prstGeom prst="rect">
+            <a:avLst/>
+          </a:prstGeom>
+        </p:spPr>
+      </p:pic>
     </p:spTree>
     <p:extLst>
       <p:ext uri="{BB962C8B-B14F-4D97-AF65-F5344CB8AC3E}">

</xml_diff>